<commit_message>
Fig3c back to two-step plotting
</commit_message>
<xml_diff>
--- a/plots/bubu_kiki.pptx
+++ b/plots/bubu_kiki.pptx
@@ -104,6 +104,11 @@
       </a:defRPr>
     </a:lvl9pPr>
   </p:defaultTextStyle>
+  <p:extLst>
+    <p:ext uri="{EFAFB233-063F-42B5-8137-9DF3F51BA10A}">
+      <p15:sldGuideLst xmlns:p15="http://schemas.microsoft.com/office/powerpoint/2012/main"/>
+    </p:ext>
+  </p:extLst>
 </p:presentation>
 </file>
 
@@ -254,7 +259,7 @@
           <a:p>
             <a:fld id="{03067F2E-8FD1-DD41-92F2-EA9D29D84F92}" type="datetimeFigureOut">
               <a:rPr lang="de-DE" smtClean="0"/>
-              <a:t>04.06.25</a:t>
+              <a:t>15.07.25</a:t>
             </a:fld>
             <a:endParaRPr lang="de-DE"/>
           </a:p>
@@ -452,7 +457,7 @@
           <a:p>
             <a:fld id="{03067F2E-8FD1-DD41-92F2-EA9D29D84F92}" type="datetimeFigureOut">
               <a:rPr lang="de-DE" smtClean="0"/>
-              <a:t>04.06.25</a:t>
+              <a:t>15.07.25</a:t>
             </a:fld>
             <a:endParaRPr lang="de-DE"/>
           </a:p>
@@ -660,7 +665,7 @@
           <a:p>
             <a:fld id="{03067F2E-8FD1-DD41-92F2-EA9D29D84F92}" type="datetimeFigureOut">
               <a:rPr lang="de-DE" smtClean="0"/>
-              <a:t>04.06.25</a:t>
+              <a:t>15.07.25</a:t>
             </a:fld>
             <a:endParaRPr lang="de-DE"/>
           </a:p>
@@ -858,7 +863,7 @@
           <a:p>
             <a:fld id="{03067F2E-8FD1-DD41-92F2-EA9D29D84F92}" type="datetimeFigureOut">
               <a:rPr lang="de-DE" smtClean="0"/>
-              <a:t>04.06.25</a:t>
+              <a:t>15.07.25</a:t>
             </a:fld>
             <a:endParaRPr lang="de-DE"/>
           </a:p>
@@ -1133,7 +1138,7 @@
           <a:p>
             <a:fld id="{03067F2E-8FD1-DD41-92F2-EA9D29D84F92}" type="datetimeFigureOut">
               <a:rPr lang="de-DE" smtClean="0"/>
-              <a:t>04.06.25</a:t>
+              <a:t>15.07.25</a:t>
             </a:fld>
             <a:endParaRPr lang="de-DE"/>
           </a:p>
@@ -1398,7 +1403,7 @@
           <a:p>
             <a:fld id="{03067F2E-8FD1-DD41-92F2-EA9D29D84F92}" type="datetimeFigureOut">
               <a:rPr lang="de-DE" smtClean="0"/>
-              <a:t>04.06.25</a:t>
+              <a:t>15.07.25</a:t>
             </a:fld>
             <a:endParaRPr lang="de-DE"/>
           </a:p>
@@ -1810,7 +1815,7 @@
           <a:p>
             <a:fld id="{03067F2E-8FD1-DD41-92F2-EA9D29D84F92}" type="datetimeFigureOut">
               <a:rPr lang="de-DE" smtClean="0"/>
-              <a:t>04.06.25</a:t>
+              <a:t>15.07.25</a:t>
             </a:fld>
             <a:endParaRPr lang="de-DE"/>
           </a:p>
@@ -1951,7 +1956,7 @@
           <a:p>
             <a:fld id="{03067F2E-8FD1-DD41-92F2-EA9D29D84F92}" type="datetimeFigureOut">
               <a:rPr lang="de-DE" smtClean="0"/>
-              <a:t>04.06.25</a:t>
+              <a:t>15.07.25</a:t>
             </a:fld>
             <a:endParaRPr lang="de-DE"/>
           </a:p>
@@ -2064,7 +2069,7 @@
           <a:p>
             <a:fld id="{03067F2E-8FD1-DD41-92F2-EA9D29D84F92}" type="datetimeFigureOut">
               <a:rPr lang="de-DE" smtClean="0"/>
-              <a:t>04.06.25</a:t>
+              <a:t>15.07.25</a:t>
             </a:fld>
             <a:endParaRPr lang="de-DE"/>
           </a:p>
@@ -2375,7 +2380,7 @@
           <a:p>
             <a:fld id="{03067F2E-8FD1-DD41-92F2-EA9D29D84F92}" type="datetimeFigureOut">
               <a:rPr lang="de-DE" smtClean="0"/>
-              <a:t>04.06.25</a:t>
+              <a:t>15.07.25</a:t>
             </a:fld>
             <a:endParaRPr lang="de-DE"/>
           </a:p>
@@ -2663,7 +2668,7 @@
           <a:p>
             <a:fld id="{03067F2E-8FD1-DD41-92F2-EA9D29D84F92}" type="datetimeFigureOut">
               <a:rPr lang="de-DE" smtClean="0"/>
-              <a:t>04.06.25</a:t>
+              <a:t>15.07.25</a:t>
             </a:fld>
             <a:endParaRPr lang="de-DE"/>
           </a:p>
@@ -2904,7 +2909,7 @@
           <a:p>
             <a:fld id="{03067F2E-8FD1-DD41-92F2-EA9D29D84F92}" type="datetimeFigureOut">
               <a:rPr lang="de-DE" smtClean="0"/>
-              <a:t>04.06.25</a:t>
+              <a:t>15.07.25</a:t>
             </a:fld>
             <a:endParaRPr lang="de-DE"/>
           </a:p>
@@ -3337,9 +3342,8 @@
         </p:nvPicPr>
         <p:blipFill>
           <a:blip r:embed="rId2"/>
-          <a:stretch>
-            <a:fillRect/>
-          </a:stretch>
+          <a:srcRect/>
+          <a:stretch/>
         </p:blipFill>
         <p:spPr>
           <a:xfrm>
@@ -3792,9 +3796,8 @@
         </p:nvPicPr>
         <p:blipFill>
           <a:blip r:embed="rId4"/>
-          <a:stretch>
-            <a:fillRect/>
-          </a:stretch>
+          <a:srcRect/>
+          <a:stretch/>
         </p:blipFill>
         <p:spPr>
           <a:xfrm>
@@ -3901,7 +3904,7 @@
         <p:spPr>
           <a:xfrm>
             <a:off x="9052565" y="1581852"/>
-            <a:ext cx="0" cy="591722"/>
+            <a:ext cx="51985" cy="572263"/>
           </a:xfrm>
           <a:prstGeom prst="straightConnector1">
             <a:avLst/>
@@ -3982,8 +3985,8 @@
         </p:nvCxnSpPr>
         <p:spPr>
           <a:xfrm flipV="1">
-            <a:off x="8813229" y="2608289"/>
-            <a:ext cx="113414" cy="884419"/>
+            <a:off x="8813229" y="2623668"/>
+            <a:ext cx="158384" cy="869040"/>
           </a:xfrm>
           <a:prstGeom prst="straightConnector1">
             <a:avLst/>

</xml_diff>

<commit_message>
Minor tweaks Figure 3c
</commit_message>
<xml_diff>
--- a/plots/bubu_kiki.pptx
+++ b/plots/bubu_kiki.pptx
@@ -259,7 +259,7 @@
           <a:p>
             <a:fld id="{03067F2E-8FD1-DD41-92F2-EA9D29D84F92}" type="datetimeFigureOut">
               <a:rPr lang="de-DE" smtClean="0"/>
-              <a:t>15.07.25</a:t>
+              <a:t>16.07.25</a:t>
             </a:fld>
             <a:endParaRPr lang="de-DE"/>
           </a:p>
@@ -457,7 +457,7 @@
           <a:p>
             <a:fld id="{03067F2E-8FD1-DD41-92F2-EA9D29D84F92}" type="datetimeFigureOut">
               <a:rPr lang="de-DE" smtClean="0"/>
-              <a:t>15.07.25</a:t>
+              <a:t>16.07.25</a:t>
             </a:fld>
             <a:endParaRPr lang="de-DE"/>
           </a:p>
@@ -665,7 +665,7 @@
           <a:p>
             <a:fld id="{03067F2E-8FD1-DD41-92F2-EA9D29D84F92}" type="datetimeFigureOut">
               <a:rPr lang="de-DE" smtClean="0"/>
-              <a:t>15.07.25</a:t>
+              <a:t>16.07.25</a:t>
             </a:fld>
             <a:endParaRPr lang="de-DE"/>
           </a:p>
@@ -863,7 +863,7 @@
           <a:p>
             <a:fld id="{03067F2E-8FD1-DD41-92F2-EA9D29D84F92}" type="datetimeFigureOut">
               <a:rPr lang="de-DE" smtClean="0"/>
-              <a:t>15.07.25</a:t>
+              <a:t>16.07.25</a:t>
             </a:fld>
             <a:endParaRPr lang="de-DE"/>
           </a:p>
@@ -1138,7 +1138,7 @@
           <a:p>
             <a:fld id="{03067F2E-8FD1-DD41-92F2-EA9D29D84F92}" type="datetimeFigureOut">
               <a:rPr lang="de-DE" smtClean="0"/>
-              <a:t>15.07.25</a:t>
+              <a:t>16.07.25</a:t>
             </a:fld>
             <a:endParaRPr lang="de-DE"/>
           </a:p>
@@ -1403,7 +1403,7 @@
           <a:p>
             <a:fld id="{03067F2E-8FD1-DD41-92F2-EA9D29D84F92}" type="datetimeFigureOut">
               <a:rPr lang="de-DE" smtClean="0"/>
-              <a:t>15.07.25</a:t>
+              <a:t>16.07.25</a:t>
             </a:fld>
             <a:endParaRPr lang="de-DE"/>
           </a:p>
@@ -1815,7 +1815,7 @@
           <a:p>
             <a:fld id="{03067F2E-8FD1-DD41-92F2-EA9D29D84F92}" type="datetimeFigureOut">
               <a:rPr lang="de-DE" smtClean="0"/>
-              <a:t>15.07.25</a:t>
+              <a:t>16.07.25</a:t>
             </a:fld>
             <a:endParaRPr lang="de-DE"/>
           </a:p>
@@ -1956,7 +1956,7 @@
           <a:p>
             <a:fld id="{03067F2E-8FD1-DD41-92F2-EA9D29D84F92}" type="datetimeFigureOut">
               <a:rPr lang="de-DE" smtClean="0"/>
-              <a:t>15.07.25</a:t>
+              <a:t>16.07.25</a:t>
             </a:fld>
             <a:endParaRPr lang="de-DE"/>
           </a:p>
@@ -2069,7 +2069,7 @@
           <a:p>
             <a:fld id="{03067F2E-8FD1-DD41-92F2-EA9D29D84F92}" type="datetimeFigureOut">
               <a:rPr lang="de-DE" smtClean="0"/>
-              <a:t>15.07.25</a:t>
+              <a:t>16.07.25</a:t>
             </a:fld>
             <a:endParaRPr lang="de-DE"/>
           </a:p>
@@ -2380,7 +2380,7 @@
           <a:p>
             <a:fld id="{03067F2E-8FD1-DD41-92F2-EA9D29D84F92}" type="datetimeFigureOut">
               <a:rPr lang="de-DE" smtClean="0"/>
-              <a:t>15.07.25</a:t>
+              <a:t>16.07.25</a:t>
             </a:fld>
             <a:endParaRPr lang="de-DE"/>
           </a:p>
@@ -2668,7 +2668,7 @@
           <a:p>
             <a:fld id="{03067F2E-8FD1-DD41-92F2-EA9D29D84F92}" type="datetimeFigureOut">
               <a:rPr lang="de-DE" smtClean="0"/>
-              <a:t>15.07.25</a:t>
+              <a:t>16.07.25</a:t>
             </a:fld>
             <a:endParaRPr lang="de-DE"/>
           </a:p>
@@ -2909,7 +2909,7 @@
           <a:p>
             <a:fld id="{03067F2E-8FD1-DD41-92F2-EA9D29D84F92}" type="datetimeFigureOut">
               <a:rPr lang="de-DE" smtClean="0"/>
-              <a:t>15.07.25</a:t>
+              <a:t>16.07.25</a:t>
             </a:fld>
             <a:endParaRPr lang="de-DE"/>
           </a:p>
@@ -3869,6 +3869,9 @@
             <a:avLst/>
           </a:prstGeom>
           <a:ln>
+            <a:solidFill>
+              <a:srgbClr val="0072B2"/>
+            </a:solidFill>
             <a:tailEnd type="stealth"/>
           </a:ln>
         </p:spPr>
@@ -3910,6 +3913,9 @@
             <a:avLst/>
           </a:prstGeom>
           <a:ln>
+            <a:solidFill>
+              <a:srgbClr val="0072B2"/>
+            </a:solidFill>
             <a:tailEnd type="stealth"/>
           </a:ln>
         </p:spPr>
@@ -3951,6 +3957,9 @@
             <a:avLst/>
           </a:prstGeom>
           <a:ln>
+            <a:solidFill>
+              <a:srgbClr val="56B4E9"/>
+            </a:solidFill>
             <a:tailEnd type="stealth"/>
           </a:ln>
         </p:spPr>
@@ -3992,6 +4001,9 @@
             <a:avLst/>
           </a:prstGeom>
           <a:ln>
+            <a:solidFill>
+              <a:srgbClr val="56B4E9"/>
+            </a:solidFill>
             <a:tailEnd type="stealth"/>
           </a:ln>
         </p:spPr>
@@ -4040,23 +4052,35 @@
           <a:p>
             <a:r>
               <a:rPr lang="de-DE" sz="1000" dirty="0" err="1">
+                <a:solidFill>
+                  <a:srgbClr val="0072B2"/>
+                </a:solidFill>
                 <a:latin typeface="Helvetica" pitchFamily="2" charset="0"/>
               </a:rPr>
               <a:t>Congruent</a:t>
             </a:r>
             <a:r>
               <a:rPr lang="de-DE" sz="1000" dirty="0">
+                <a:solidFill>
+                  <a:srgbClr val="0072B2"/>
+                </a:solidFill>
                 <a:latin typeface="Helvetica" pitchFamily="2" charset="0"/>
               </a:rPr>
               <a:t> </a:t>
             </a:r>
             <a:r>
               <a:rPr lang="de-DE" sz="1000" dirty="0" err="1">
+                <a:solidFill>
+                  <a:srgbClr val="0072B2"/>
+                </a:solidFill>
                 <a:latin typeface="Helvetica" pitchFamily="2" charset="0"/>
               </a:rPr>
               <a:t>stimuli</a:t>
             </a:r>
             <a:endParaRPr lang="de-DE" sz="1000" dirty="0">
+              <a:solidFill>
+                <a:srgbClr val="0072B2"/>
+              </a:solidFill>
               <a:latin typeface="Helvetica" pitchFamily="2" charset="0"/>
             </a:endParaRPr>
           </a:p>
@@ -4092,23 +4116,35 @@
           <a:p>
             <a:r>
               <a:rPr lang="de-DE" sz="1000" dirty="0" err="1">
+                <a:solidFill>
+                  <a:srgbClr val="56B4E9"/>
+                </a:solidFill>
                 <a:latin typeface="Helvetica" pitchFamily="2" charset="0"/>
               </a:rPr>
               <a:t>Incongruent</a:t>
             </a:r>
             <a:r>
               <a:rPr lang="de-DE" sz="1000" dirty="0">
+                <a:solidFill>
+                  <a:srgbClr val="56B4E9"/>
+                </a:solidFill>
                 <a:latin typeface="Helvetica" pitchFamily="2" charset="0"/>
               </a:rPr>
               <a:t> </a:t>
             </a:r>
             <a:r>
               <a:rPr lang="de-DE" sz="1000" dirty="0" err="1">
+                <a:solidFill>
+                  <a:srgbClr val="56B4E9"/>
+                </a:solidFill>
                 <a:latin typeface="Helvetica" pitchFamily="2" charset="0"/>
               </a:rPr>
               <a:t>stimuli</a:t>
             </a:r>
             <a:endParaRPr lang="de-DE" sz="1000" dirty="0">
+              <a:solidFill>
+                <a:srgbClr val="56B4E9"/>
+              </a:solidFill>
               <a:latin typeface="Helvetica" pitchFamily="2" charset="0"/>
             </a:endParaRPr>
           </a:p>

</xml_diff>